<commit_message>
updated the 1st module ppt with required subdivisions
</commit_message>
<xml_diff>
--- a/ldd.pptx
+++ b/ldd.pptx
@@ -7,21 +7,37 @@
   <p:sldIdLst>
     <p:sldId id="256" r:id="rId2"/>
     <p:sldId id="257" r:id="rId3"/>
-    <p:sldId id="272" r:id="rId4"/>
-    <p:sldId id="258" r:id="rId5"/>
-    <p:sldId id="259" r:id="rId6"/>
-    <p:sldId id="260" r:id="rId7"/>
-    <p:sldId id="261" r:id="rId8"/>
-    <p:sldId id="262" r:id="rId9"/>
-    <p:sldId id="263" r:id="rId10"/>
-    <p:sldId id="264" r:id="rId11"/>
-    <p:sldId id="265" r:id="rId12"/>
-    <p:sldId id="266" r:id="rId13"/>
-    <p:sldId id="267" r:id="rId14"/>
-    <p:sldId id="268" r:id="rId15"/>
-    <p:sldId id="269" r:id="rId16"/>
-    <p:sldId id="270" r:id="rId17"/>
-    <p:sldId id="271" r:id="rId18"/>
+    <p:sldId id="273" r:id="rId4"/>
+    <p:sldId id="274" r:id="rId5"/>
+    <p:sldId id="275" r:id="rId6"/>
+    <p:sldId id="276" r:id="rId7"/>
+    <p:sldId id="277" r:id="rId8"/>
+    <p:sldId id="278" r:id="rId9"/>
+    <p:sldId id="279" r:id="rId10"/>
+    <p:sldId id="280" r:id="rId11"/>
+    <p:sldId id="281" r:id="rId12"/>
+    <p:sldId id="282" r:id="rId13"/>
+    <p:sldId id="283" r:id="rId14"/>
+    <p:sldId id="284" r:id="rId15"/>
+    <p:sldId id="285" r:id="rId16"/>
+    <p:sldId id="286" r:id="rId17"/>
+    <p:sldId id="287" r:id="rId18"/>
+    <p:sldId id="288" r:id="rId19"/>
+    <p:sldId id="272" r:id="rId20"/>
+    <p:sldId id="258" r:id="rId21"/>
+    <p:sldId id="259" r:id="rId22"/>
+    <p:sldId id="260" r:id="rId23"/>
+    <p:sldId id="261" r:id="rId24"/>
+    <p:sldId id="262" r:id="rId25"/>
+    <p:sldId id="263" r:id="rId26"/>
+    <p:sldId id="264" r:id="rId27"/>
+    <p:sldId id="265" r:id="rId28"/>
+    <p:sldId id="266" r:id="rId29"/>
+    <p:sldId id="267" r:id="rId30"/>
+    <p:sldId id="268" r:id="rId31"/>
+    <p:sldId id="269" r:id="rId32"/>
+    <p:sldId id="270" r:id="rId33"/>
+    <p:sldId id="271" r:id="rId34"/>
   </p:sldIdLst>
   <p:sldSz cx="12192000" cy="6858000"/>
   <p:notesSz cx="6858000" cy="9144000"/>
@@ -2426,8 +2442,8 @@
     <dgm:cxn modelId="{956C1885-EBB5-48BE-AB39-2117DBFCC867}" srcId="{5A00E879-E4C5-4430-B3A9-96261AB1175F}" destId="{5DDFE096-83AE-4F7F-8914-F805B25D2ECB}" srcOrd="0" destOrd="0" parTransId="{CA02A3E4-75A7-4B0A-9D64-E5868BE19E3A}" sibTransId="{0FCBEBC8-A0A5-459F-A8AF-051D302AA875}"/>
     <dgm:cxn modelId="{829DFB9A-FF37-432E-8BA4-3BD9831AC8FC}" type="presOf" srcId="{BF1D9F4D-C8CF-49F5-A279-F991CC338B2E}" destId="{C63C869D-0AB6-4BF3-A0DA-3C42516F2E41}" srcOrd="1" destOrd="0" presId="urn:microsoft.com/office/officeart/2005/8/layout/vProcess5"/>
     <dgm:cxn modelId="{46621407-6951-4F61-8617-5DFBF7EF5F92}" type="presOf" srcId="{ACC501D1-1524-4B9F-B64E-10A9391E59E8}" destId="{F844299D-57DB-4389-8426-C3FC9892662E}" srcOrd="1" destOrd="0" presId="urn:microsoft.com/office/officeart/2005/8/layout/vProcess5"/>
+    <dgm:cxn modelId="{6E0EE155-D8B2-41C9-BBB0-3F2D5E2E705F}" srcId="{5A00E879-E4C5-4430-B3A9-96261AB1175F}" destId="{9F7EEBA9-D6EA-45A0-A5AA-612AC4117BF5}" srcOrd="1" destOrd="0" parTransId="{D8B1D6D7-1BB4-427D-921C-0828D5DF8B85}" sibTransId="{FEFDB70B-D746-4062-8398-17347DB99B5E}"/>
     <dgm:cxn modelId="{A94FF5D0-8534-4D83-8347-4AE483021E29}" srcId="{5A00E879-E4C5-4430-B3A9-96261AB1175F}" destId="{68E2792F-4706-4941-ACCD-B81BA0D7076C}" srcOrd="4" destOrd="0" parTransId="{749F80D8-F9BA-44C8-B772-C0D7EDB6A112}" sibTransId="{69FF0C2E-469F-46C6-A801-CEB77B8306E2}"/>
-    <dgm:cxn modelId="{6E0EE155-D8B2-41C9-BBB0-3F2D5E2E705F}" srcId="{5A00E879-E4C5-4430-B3A9-96261AB1175F}" destId="{9F7EEBA9-D6EA-45A0-A5AA-612AC4117BF5}" srcOrd="1" destOrd="0" parTransId="{D8B1D6D7-1BB4-427D-921C-0828D5DF8B85}" sibTransId="{FEFDB70B-D746-4062-8398-17347DB99B5E}"/>
     <dgm:cxn modelId="{426302F6-3026-48A2-B0A0-8A7088291EC0}" type="presOf" srcId="{3AF8AD60-8B03-443D-BD58-3C7EE6A70078}" destId="{78FB2E9E-6E6D-498F-B95E-B340F809A4BD}" srcOrd="0" destOrd="0" presId="urn:microsoft.com/office/officeart/2005/8/layout/vProcess5"/>
     <dgm:cxn modelId="{CB99050E-ABF8-4636-9B20-763CB94E977B}" type="presOf" srcId="{68E2792F-4706-4941-ACCD-B81BA0D7076C}" destId="{C080336D-B030-4167-A9AF-5BA4A94AC084}" srcOrd="0" destOrd="0" presId="urn:microsoft.com/office/officeart/2005/8/layout/vProcess5"/>
     <dgm:cxn modelId="{5B7B70E2-A5D3-4F1E-A2EC-DC235B711387}" type="presOf" srcId="{ACC501D1-1524-4B9F-B64E-10A9391E59E8}" destId="{638B6C17-E602-4CFD-B1CA-4F25DF2BF136}" srcOrd="0" destOrd="0" presId="urn:microsoft.com/office/officeart/2005/8/layout/vProcess5"/>
@@ -8313,7 +8329,7 @@
           <a:p>
             <a:fld id="{AE2F65C5-661A-4CA8-B489-C77145936790}" type="datetimeFigureOut">
               <a:rPr lang="en-IN" smtClean="0"/>
-              <a:t>04-06-2018</a:t>
+              <a:t>05-06-2018</a:t>
             </a:fld>
             <a:endParaRPr lang="en-IN"/>
           </a:p>
@@ -8483,7 +8499,7 @@
           <a:p>
             <a:fld id="{AE2F65C5-661A-4CA8-B489-C77145936790}" type="datetimeFigureOut">
               <a:rPr lang="en-IN" smtClean="0"/>
-              <a:t>04-06-2018</a:t>
+              <a:t>05-06-2018</a:t>
             </a:fld>
             <a:endParaRPr lang="en-IN"/>
           </a:p>
@@ -8663,7 +8679,7 @@
           <a:p>
             <a:fld id="{AE2F65C5-661A-4CA8-B489-C77145936790}" type="datetimeFigureOut">
               <a:rPr lang="en-IN" smtClean="0"/>
-              <a:t>04-06-2018</a:t>
+              <a:t>05-06-2018</a:t>
             </a:fld>
             <a:endParaRPr lang="en-IN"/>
           </a:p>
@@ -8833,7 +8849,7 @@
           <a:p>
             <a:fld id="{AE2F65C5-661A-4CA8-B489-C77145936790}" type="datetimeFigureOut">
               <a:rPr lang="en-IN" smtClean="0"/>
-              <a:t>04-06-2018</a:t>
+              <a:t>05-06-2018</a:t>
             </a:fld>
             <a:endParaRPr lang="en-IN"/>
           </a:p>
@@ -9079,7 +9095,7 @@
           <a:p>
             <a:fld id="{AE2F65C5-661A-4CA8-B489-C77145936790}" type="datetimeFigureOut">
               <a:rPr lang="en-IN" smtClean="0"/>
-              <a:t>04-06-2018</a:t>
+              <a:t>05-06-2018</a:t>
             </a:fld>
             <a:endParaRPr lang="en-IN"/>
           </a:p>
@@ -9311,7 +9327,7 @@
           <a:p>
             <a:fld id="{AE2F65C5-661A-4CA8-B489-C77145936790}" type="datetimeFigureOut">
               <a:rPr lang="en-IN" smtClean="0"/>
-              <a:t>04-06-2018</a:t>
+              <a:t>05-06-2018</a:t>
             </a:fld>
             <a:endParaRPr lang="en-IN"/>
           </a:p>
@@ -9678,7 +9694,7 @@
           <a:p>
             <a:fld id="{AE2F65C5-661A-4CA8-B489-C77145936790}" type="datetimeFigureOut">
               <a:rPr lang="en-IN" smtClean="0"/>
-              <a:t>04-06-2018</a:t>
+              <a:t>05-06-2018</a:t>
             </a:fld>
             <a:endParaRPr lang="en-IN"/>
           </a:p>
@@ -9796,7 +9812,7 @@
           <a:p>
             <a:fld id="{AE2F65C5-661A-4CA8-B489-C77145936790}" type="datetimeFigureOut">
               <a:rPr lang="en-IN" smtClean="0"/>
-              <a:t>04-06-2018</a:t>
+              <a:t>05-06-2018</a:t>
             </a:fld>
             <a:endParaRPr lang="en-IN"/>
           </a:p>
@@ -9891,7 +9907,7 @@
           <a:p>
             <a:fld id="{AE2F65C5-661A-4CA8-B489-C77145936790}" type="datetimeFigureOut">
               <a:rPr lang="en-IN" smtClean="0"/>
-              <a:t>04-06-2018</a:t>
+              <a:t>05-06-2018</a:t>
             </a:fld>
             <a:endParaRPr lang="en-IN"/>
           </a:p>
@@ -10168,7 +10184,7 @@
           <a:p>
             <a:fld id="{AE2F65C5-661A-4CA8-B489-C77145936790}" type="datetimeFigureOut">
               <a:rPr lang="en-IN" smtClean="0"/>
-              <a:t>04-06-2018</a:t>
+              <a:t>05-06-2018</a:t>
             </a:fld>
             <a:endParaRPr lang="en-IN"/>
           </a:p>
@@ -10421,7 +10437,7 @@
           <a:p>
             <a:fld id="{AE2F65C5-661A-4CA8-B489-C77145936790}" type="datetimeFigureOut">
               <a:rPr lang="en-IN" smtClean="0"/>
-              <a:t>04-06-2018</a:t>
+              <a:t>05-06-2018</a:t>
             </a:fld>
             <a:endParaRPr lang="en-IN"/>
           </a:p>
@@ -10634,7 +10650,7 @@
           <a:p>
             <a:fld id="{AE2F65C5-661A-4CA8-B489-C77145936790}" type="datetimeFigureOut">
               <a:rPr lang="en-IN" smtClean="0"/>
-              <a:t>04-06-2018</a:t>
+              <a:t>05-06-2018</a:t>
             </a:fld>
             <a:endParaRPr lang="en-IN"/>
           </a:p>
@@ -11132,7 +11148,7 @@
           <a:p>
             <a:r>
               <a:rPr lang="en-US" dirty="0" smtClean="0"/>
-              <a:t>USB DEVICES</a:t>
+              <a:t>First device Driver:</a:t>
             </a:r>
             <a:endParaRPr lang="en-IN" dirty="0"/>
           </a:p>
@@ -11160,7 +11176,7 @@
     </p:spTree>
     <p:extLst>
       <p:ext uri="{BB962C8B-B14F-4D97-AF65-F5344CB8AC3E}">
-        <p14:creationId xmlns:p14="http://schemas.microsoft.com/office/powerpoint/2010/main" val="1115652092"/>
+        <p14:creationId xmlns:p14="http://schemas.microsoft.com/office/powerpoint/2010/main" val="2646846607"/>
       </p:ext>
     </p:extLst>
   </p:cSld>
@@ -11204,7 +11220,7 @@
           <a:p>
             <a:r>
               <a:rPr lang="en-US" dirty="0" smtClean="0"/>
-              <a:t>BLOCK DEVICES</a:t>
+              <a:t>Building and running modules:</a:t>
             </a:r>
             <a:endParaRPr lang="en-IN" dirty="0"/>
           </a:p>
@@ -11232,7 +11248,7 @@
     </p:spTree>
     <p:extLst>
       <p:ext uri="{BB962C8B-B14F-4D97-AF65-F5344CB8AC3E}">
-        <p14:creationId xmlns:p14="http://schemas.microsoft.com/office/powerpoint/2010/main" val="3028707880"/>
+        <p14:creationId xmlns:p14="http://schemas.microsoft.com/office/powerpoint/2010/main" val="240881125"/>
       </p:ext>
     </p:extLst>
   </p:cSld>
@@ -11276,7 +11292,7 @@
           <a:p>
             <a:r>
               <a:rPr lang="en-US" dirty="0" smtClean="0"/>
-              <a:t>PCI INTERFACE</a:t>
+              <a:t>Module parameters:</a:t>
             </a:r>
             <a:endParaRPr lang="en-IN" dirty="0"/>
           </a:p>
@@ -11304,7 +11320,7 @@
     </p:spTree>
     <p:extLst>
       <p:ext uri="{BB962C8B-B14F-4D97-AF65-F5344CB8AC3E}">
-        <p14:creationId xmlns:p14="http://schemas.microsoft.com/office/powerpoint/2010/main" val="1666987590"/>
+        <p14:creationId xmlns:p14="http://schemas.microsoft.com/office/powerpoint/2010/main" val="1275934860"/>
       </p:ext>
     </p:extLst>
   </p:cSld>
@@ -11348,7 +11364,7 @@
           <a:p>
             <a:r>
               <a:rPr lang="en-US" dirty="0" smtClean="0"/>
-              <a:t>LINUX DEVICE MODEL</a:t>
+              <a:t>Debugging techniques:</a:t>
             </a:r>
             <a:endParaRPr lang="en-IN" dirty="0"/>
           </a:p>
@@ -11376,7 +11392,7 @@
     </p:spTree>
     <p:extLst>
       <p:ext uri="{BB962C8B-B14F-4D97-AF65-F5344CB8AC3E}">
-        <p14:creationId xmlns:p14="http://schemas.microsoft.com/office/powerpoint/2010/main" val="2790520241"/>
+        <p14:creationId xmlns:p14="http://schemas.microsoft.com/office/powerpoint/2010/main" val="2339502745"/>
       </p:ext>
     </p:extLst>
   </p:cSld>
@@ -11420,7 +11436,7 @@
           <a:p>
             <a:r>
               <a:rPr lang="en-US" dirty="0" smtClean="0"/>
-              <a:t>LINUX KERNEL BUILD AND STATIC LINKING</a:t>
+              <a:t>Data types in kernel:</a:t>
             </a:r>
             <a:endParaRPr lang="en-IN" dirty="0"/>
           </a:p>
@@ -11448,7 +11464,7 @@
     </p:spTree>
     <p:extLst>
       <p:ext uri="{BB962C8B-B14F-4D97-AF65-F5344CB8AC3E}">
-        <p14:creationId xmlns:p14="http://schemas.microsoft.com/office/powerpoint/2010/main" val="3827052536"/>
+        <p14:creationId xmlns:p14="http://schemas.microsoft.com/office/powerpoint/2010/main" val="3671308595"/>
       </p:ext>
     </p:extLst>
   </p:cSld>
@@ -11492,7 +11508,15 @@
           <a:p>
             <a:r>
               <a:rPr lang="en-US" dirty="0" smtClean="0"/>
-              <a:t>SERIAL PORT</a:t>
+              <a:t>Kernel c extras in </a:t>
+            </a:r>
+            <a:r>
+              <a:rPr lang="en-US" dirty="0" err="1" smtClean="0"/>
+              <a:t>linux</a:t>
+            </a:r>
+            <a:r>
+              <a:rPr lang="en-US" dirty="0" smtClean="0"/>
+              <a:t> device driver</a:t>
             </a:r>
             <a:endParaRPr lang="en-IN" dirty="0"/>
           </a:p>
@@ -11520,7 +11544,7 @@
     </p:spTree>
     <p:extLst>
       <p:ext uri="{BB962C8B-B14F-4D97-AF65-F5344CB8AC3E}">
-        <p14:creationId xmlns:p14="http://schemas.microsoft.com/office/powerpoint/2010/main" val="2655153619"/>
+        <p14:creationId xmlns:p14="http://schemas.microsoft.com/office/powerpoint/2010/main" val="2875671877"/>
       </p:ext>
     </p:extLst>
   </p:cSld>
@@ -11563,8 +11587,8 @@
           <a:lstStyle/>
           <a:p>
             <a:r>
-              <a:rPr lang="en-US" dirty="0" smtClean="0"/>
-              <a:t>PARALLEL PORT</a:t>
+              <a:rPr lang="en-US" dirty="0" err="1" smtClean="0"/>
+              <a:t>Procfs</a:t>
             </a:r>
             <a:endParaRPr lang="en-IN" dirty="0"/>
           </a:p>
@@ -11592,7 +11616,7 @@
     </p:spTree>
     <p:extLst>
       <p:ext uri="{BB962C8B-B14F-4D97-AF65-F5344CB8AC3E}">
-        <p14:creationId xmlns:p14="http://schemas.microsoft.com/office/powerpoint/2010/main" val="3805137301"/>
+        <p14:creationId xmlns:p14="http://schemas.microsoft.com/office/powerpoint/2010/main" val="3267267256"/>
       </p:ext>
     </p:extLst>
   </p:cSld>
@@ -11635,8 +11659,8 @@
           <a:lstStyle/>
           <a:p>
             <a:r>
-              <a:rPr lang="en-US" dirty="0" smtClean="0"/>
-              <a:t>BEAGLE BONE BLACK</a:t>
+              <a:rPr lang="en-US" dirty="0" err="1" smtClean="0"/>
+              <a:t>sysfs</a:t>
             </a:r>
             <a:endParaRPr lang="en-IN" dirty="0"/>
           </a:p>
@@ -11664,7 +11688,157 @@
     </p:spTree>
     <p:extLst>
       <p:ext uri="{BB962C8B-B14F-4D97-AF65-F5344CB8AC3E}">
-        <p14:creationId xmlns:p14="http://schemas.microsoft.com/office/powerpoint/2010/main" val="2923373928"/>
+        <p14:creationId xmlns:p14="http://schemas.microsoft.com/office/powerpoint/2010/main" val="211774762"/>
+      </p:ext>
+    </p:extLst>
+  </p:cSld>
+  <p:clrMapOvr>
+    <a:masterClrMapping/>
+  </p:clrMapOvr>
+</p:sld>
+</file>
+
+<file path=ppt/slides/slide18.xml><?xml version="1.0" encoding="utf-8"?>
+<p:sld xmlns:a="http://schemas.openxmlformats.org/drawingml/2006/main" xmlns:r="http://schemas.openxmlformats.org/officeDocument/2006/relationships" xmlns:p="http://schemas.openxmlformats.org/presentationml/2006/main">
+  <p:cSld>
+    <p:spTree>
+      <p:nvGrpSpPr>
+        <p:cNvPr id="1" name=""/>
+        <p:cNvGrpSpPr/>
+        <p:nvPr/>
+      </p:nvGrpSpPr>
+      <p:grpSpPr>
+        <a:xfrm>
+          <a:off x="0" y="0"/>
+          <a:ext cx="0" cy="0"/>
+          <a:chOff x="0" y="0"/>
+          <a:chExt cx="0" cy="0"/>
+        </a:xfrm>
+      </p:grpSpPr>
+      <p:sp>
+        <p:nvSpPr>
+          <p:cNvPr id="2" name="Title 1"/>
+          <p:cNvSpPr>
+            <a:spLocks noGrp="1"/>
+          </p:cNvSpPr>
+          <p:nvPr>
+            <p:ph type="title"/>
+          </p:nvPr>
+        </p:nvSpPr>
+        <p:spPr/>
+        <p:txBody>
+          <a:bodyPr/>
+          <a:lstStyle/>
+          <a:p>
+            <a:r>
+              <a:rPr lang="en-US" dirty="0" smtClean="0"/>
+              <a:t>Module </a:t>
+            </a:r>
+            <a:r>
+              <a:rPr lang="en-US" dirty="0" err="1" smtClean="0"/>
+              <a:t>Interractions</a:t>
+            </a:r>
+            <a:endParaRPr lang="en-IN" dirty="0"/>
+          </a:p>
+        </p:txBody>
+      </p:sp>
+      <p:sp>
+        <p:nvSpPr>
+          <p:cNvPr id="3" name="Content Placeholder 2"/>
+          <p:cNvSpPr>
+            <a:spLocks noGrp="1"/>
+          </p:cNvSpPr>
+          <p:nvPr>
+            <p:ph idx="1"/>
+          </p:nvPr>
+        </p:nvSpPr>
+        <p:spPr/>
+        <p:txBody>
+          <a:bodyPr/>
+          <a:lstStyle/>
+          <a:p>
+            <a:endParaRPr lang="en-IN"/>
+          </a:p>
+        </p:txBody>
+      </p:sp>
+    </p:spTree>
+    <p:extLst>
+      <p:ext uri="{BB962C8B-B14F-4D97-AF65-F5344CB8AC3E}">
+        <p14:creationId xmlns:p14="http://schemas.microsoft.com/office/powerpoint/2010/main" val="1749109950"/>
+      </p:ext>
+    </p:extLst>
+  </p:cSld>
+  <p:clrMapOvr>
+    <a:masterClrMapping/>
+  </p:clrMapOvr>
+</p:sld>
+</file>
+
+<file path=ppt/slides/slide19.xml><?xml version="1.0" encoding="utf-8"?>
+<p:sld xmlns:a="http://schemas.openxmlformats.org/drawingml/2006/main" xmlns:r="http://schemas.openxmlformats.org/officeDocument/2006/relationships" xmlns:p="http://schemas.openxmlformats.org/presentationml/2006/main">
+  <p:cSld>
+    <p:spTree>
+      <p:nvGrpSpPr>
+        <p:cNvPr id="1" name=""/>
+        <p:cNvGrpSpPr/>
+        <p:nvPr/>
+      </p:nvGrpSpPr>
+      <p:grpSpPr>
+        <a:xfrm>
+          <a:off x="0" y="0"/>
+          <a:ext cx="0" cy="0"/>
+          <a:chOff x="0" y="0"/>
+          <a:chExt cx="0" cy="0"/>
+        </a:xfrm>
+      </p:grpSpPr>
+      <p:sp>
+        <p:nvSpPr>
+          <p:cNvPr id="2" name="Title 1"/>
+          <p:cNvSpPr>
+            <a:spLocks noGrp="1"/>
+          </p:cNvSpPr>
+          <p:nvPr>
+            <p:ph type="title"/>
+          </p:nvPr>
+        </p:nvSpPr>
+        <p:spPr/>
+        <p:txBody>
+          <a:bodyPr/>
+          <a:lstStyle/>
+          <a:p>
+            <a:endParaRPr lang="en-IN"/>
+          </a:p>
+        </p:txBody>
+      </p:sp>
+      <p:graphicFrame>
+        <p:nvGraphicFramePr>
+          <p:cNvPr id="4" name="Content Placeholder 3"/>
+          <p:cNvGraphicFramePr>
+            <a:graphicFrameLocks noGrp="1"/>
+          </p:cNvGraphicFramePr>
+          <p:nvPr>
+            <p:ph idx="1"/>
+            <p:extLst>
+              <p:ext uri="{D42A27DB-BD31-4B8C-83A1-F6EECF244321}">
+                <p14:modId xmlns:p14="http://schemas.microsoft.com/office/powerpoint/2010/main" val="272219533"/>
+              </p:ext>
+            </p:extLst>
+          </p:nvPr>
+        </p:nvGraphicFramePr>
+        <p:xfrm>
+          <a:off x="838200" y="1825625"/>
+          <a:ext cx="8636000" cy="2593975"/>
+        </p:xfrm>
+        <a:graphic>
+          <a:graphicData uri="http://schemas.openxmlformats.org/drawingml/2006/diagram">
+            <dgm:relIds xmlns:dgm="http://schemas.openxmlformats.org/drawingml/2006/diagram" xmlns:r="http://schemas.openxmlformats.org/officeDocument/2006/relationships" r:dm="rId2" r:lo="rId3" r:qs="rId4" r:cs="rId5"/>
+          </a:graphicData>
+        </a:graphic>
+      </p:graphicFrame>
+    </p:spTree>
+    <p:extLst>
+      <p:ext uri="{BB962C8B-B14F-4D97-AF65-F5344CB8AC3E}">
+        <p14:creationId xmlns:p14="http://schemas.microsoft.com/office/powerpoint/2010/main" val="1001706900"/>
       </p:ext>
     </p:extLst>
   </p:cSld>
@@ -11746,6 +11920,743 @@
 </p:sld>
 </file>
 
+<file path=ppt/slides/slide20.xml><?xml version="1.0" encoding="utf-8"?>
+<p:sld xmlns:a="http://schemas.openxmlformats.org/drawingml/2006/main" xmlns:r="http://schemas.openxmlformats.org/officeDocument/2006/relationships" xmlns:p="http://schemas.openxmlformats.org/presentationml/2006/main">
+  <p:cSld>
+    <p:spTree>
+      <p:nvGrpSpPr>
+        <p:cNvPr id="1" name=""/>
+        <p:cNvGrpSpPr/>
+        <p:nvPr/>
+      </p:nvGrpSpPr>
+      <p:grpSpPr>
+        <a:xfrm>
+          <a:off x="0" y="0"/>
+          <a:ext cx="0" cy="0"/>
+          <a:chOff x="0" y="0"/>
+          <a:chExt cx="0" cy="0"/>
+        </a:xfrm>
+      </p:grpSpPr>
+      <p:sp>
+        <p:nvSpPr>
+          <p:cNvPr id="2" name="Title 1"/>
+          <p:cNvSpPr>
+            <a:spLocks noGrp="1"/>
+          </p:cNvSpPr>
+          <p:nvPr>
+            <p:ph type="title"/>
+          </p:nvPr>
+        </p:nvSpPr>
+        <p:spPr/>
+        <p:txBody>
+          <a:bodyPr/>
+          <a:lstStyle/>
+          <a:p>
+            <a:r>
+              <a:rPr lang="en-US" dirty="0" smtClean="0"/>
+              <a:t>CHARACTER DRIVERS</a:t>
+            </a:r>
+            <a:endParaRPr lang="en-IN" dirty="0"/>
+          </a:p>
+        </p:txBody>
+      </p:sp>
+      <p:graphicFrame>
+        <p:nvGraphicFramePr>
+          <p:cNvPr id="4" name="Content Placeholder 3"/>
+          <p:cNvGraphicFramePr>
+            <a:graphicFrameLocks noGrp="1"/>
+          </p:cNvGraphicFramePr>
+          <p:nvPr>
+            <p:ph idx="1"/>
+            <p:extLst>
+              <p:ext uri="{D42A27DB-BD31-4B8C-83A1-F6EECF244321}">
+                <p14:modId xmlns:p14="http://schemas.microsoft.com/office/powerpoint/2010/main" val="828305667"/>
+              </p:ext>
+            </p:extLst>
+          </p:nvPr>
+        </p:nvGraphicFramePr>
+        <p:xfrm>
+          <a:off x="838200" y="1825625"/>
+          <a:ext cx="10515600" cy="4351338"/>
+        </p:xfrm>
+        <a:graphic>
+          <a:graphicData uri="http://schemas.openxmlformats.org/drawingml/2006/diagram">
+            <dgm:relIds xmlns:dgm="http://schemas.openxmlformats.org/drawingml/2006/diagram" xmlns:r="http://schemas.openxmlformats.org/officeDocument/2006/relationships" r:dm="rId2" r:lo="rId3" r:qs="rId4" r:cs="rId5"/>
+          </a:graphicData>
+        </a:graphic>
+      </p:graphicFrame>
+    </p:spTree>
+    <p:extLst>
+      <p:ext uri="{BB962C8B-B14F-4D97-AF65-F5344CB8AC3E}">
+        <p14:creationId xmlns:p14="http://schemas.microsoft.com/office/powerpoint/2010/main" val="3205233571"/>
+      </p:ext>
+    </p:extLst>
+  </p:cSld>
+  <p:clrMapOvr>
+    <a:masterClrMapping/>
+  </p:clrMapOvr>
+</p:sld>
+</file>
+
+<file path=ppt/slides/slide21.xml><?xml version="1.0" encoding="utf-8"?>
+<p:sld xmlns:a="http://schemas.openxmlformats.org/drawingml/2006/main" xmlns:r="http://schemas.openxmlformats.org/officeDocument/2006/relationships" xmlns:p="http://schemas.openxmlformats.org/presentationml/2006/main">
+  <p:cSld>
+    <p:spTree>
+      <p:nvGrpSpPr>
+        <p:cNvPr id="1" name=""/>
+        <p:cNvGrpSpPr/>
+        <p:nvPr/>
+      </p:nvGrpSpPr>
+      <p:grpSpPr>
+        <a:xfrm>
+          <a:off x="0" y="0"/>
+          <a:ext cx="0" cy="0"/>
+          <a:chOff x="0" y="0"/>
+          <a:chExt cx="0" cy="0"/>
+        </a:xfrm>
+      </p:grpSpPr>
+      <p:sp>
+        <p:nvSpPr>
+          <p:cNvPr id="2" name="Title 1"/>
+          <p:cNvSpPr>
+            <a:spLocks noGrp="1"/>
+          </p:cNvSpPr>
+          <p:nvPr>
+            <p:ph type="title"/>
+          </p:nvPr>
+        </p:nvSpPr>
+        <p:spPr/>
+        <p:txBody>
+          <a:bodyPr/>
+          <a:lstStyle/>
+          <a:p>
+            <a:r>
+              <a:rPr lang="en-US" dirty="0" smtClean="0"/>
+              <a:t>ADVANCED CHARACTER DRIVER OPERATIONS</a:t>
+            </a:r>
+            <a:endParaRPr lang="en-IN" dirty="0"/>
+          </a:p>
+        </p:txBody>
+      </p:sp>
+      <p:sp>
+        <p:nvSpPr>
+          <p:cNvPr id="3" name="Content Placeholder 2"/>
+          <p:cNvSpPr>
+            <a:spLocks noGrp="1"/>
+          </p:cNvSpPr>
+          <p:nvPr>
+            <p:ph idx="1"/>
+          </p:nvPr>
+        </p:nvSpPr>
+        <p:spPr/>
+        <p:txBody>
+          <a:bodyPr/>
+          <a:lstStyle/>
+          <a:p>
+            <a:r>
+              <a:rPr lang="en-US" dirty="0" err="1" smtClean="0"/>
+              <a:t>Lseek</a:t>
+            </a:r>
+            <a:endParaRPr lang="en-US" dirty="0" smtClean="0"/>
+          </a:p>
+          <a:p>
+            <a:r>
+              <a:rPr lang="en-US" dirty="0" err="1" smtClean="0"/>
+              <a:t>ioctl</a:t>
+            </a:r>
+            <a:endParaRPr lang="en-IN" dirty="0"/>
+          </a:p>
+        </p:txBody>
+      </p:sp>
+    </p:spTree>
+    <p:extLst>
+      <p:ext uri="{BB962C8B-B14F-4D97-AF65-F5344CB8AC3E}">
+        <p14:creationId xmlns:p14="http://schemas.microsoft.com/office/powerpoint/2010/main" val="1391139471"/>
+      </p:ext>
+    </p:extLst>
+  </p:cSld>
+  <p:clrMapOvr>
+    <a:masterClrMapping/>
+  </p:clrMapOvr>
+</p:sld>
+</file>
+
+<file path=ppt/slides/slide22.xml><?xml version="1.0" encoding="utf-8"?>
+<p:sld xmlns:a="http://schemas.openxmlformats.org/drawingml/2006/main" xmlns:r="http://schemas.openxmlformats.org/officeDocument/2006/relationships" xmlns:p="http://schemas.openxmlformats.org/presentationml/2006/main">
+  <p:cSld>
+    <p:spTree>
+      <p:nvGrpSpPr>
+        <p:cNvPr id="1" name=""/>
+        <p:cNvGrpSpPr/>
+        <p:nvPr/>
+      </p:nvGrpSpPr>
+      <p:grpSpPr>
+        <a:xfrm>
+          <a:off x="0" y="0"/>
+          <a:ext cx="0" cy="0"/>
+          <a:chOff x="0" y="0"/>
+          <a:chExt cx="0" cy="0"/>
+        </a:xfrm>
+      </p:grpSpPr>
+      <p:sp>
+        <p:nvSpPr>
+          <p:cNvPr id="2" name="Title 1"/>
+          <p:cNvSpPr>
+            <a:spLocks noGrp="1"/>
+          </p:cNvSpPr>
+          <p:nvPr>
+            <p:ph type="title"/>
+          </p:nvPr>
+        </p:nvSpPr>
+        <p:spPr/>
+        <p:txBody>
+          <a:bodyPr/>
+          <a:lstStyle/>
+          <a:p>
+            <a:r>
+              <a:rPr lang="en-US" dirty="0" smtClean="0"/>
+              <a:t>FLOW OF TIME</a:t>
+            </a:r>
+            <a:endParaRPr lang="en-IN" dirty="0"/>
+          </a:p>
+        </p:txBody>
+      </p:sp>
+      <p:sp>
+        <p:nvSpPr>
+          <p:cNvPr id="3" name="Content Placeholder 2"/>
+          <p:cNvSpPr>
+            <a:spLocks noGrp="1"/>
+          </p:cNvSpPr>
+          <p:nvPr>
+            <p:ph idx="1"/>
+          </p:nvPr>
+        </p:nvSpPr>
+        <p:spPr/>
+        <p:txBody>
+          <a:bodyPr/>
+          <a:lstStyle/>
+          <a:p>
+            <a:endParaRPr lang="en-IN"/>
+          </a:p>
+        </p:txBody>
+      </p:sp>
+    </p:spTree>
+    <p:extLst>
+      <p:ext uri="{BB962C8B-B14F-4D97-AF65-F5344CB8AC3E}">
+        <p14:creationId xmlns:p14="http://schemas.microsoft.com/office/powerpoint/2010/main" val="92878347"/>
+      </p:ext>
+    </p:extLst>
+  </p:cSld>
+  <p:clrMapOvr>
+    <a:masterClrMapping/>
+  </p:clrMapOvr>
+</p:sld>
+</file>
+
+<file path=ppt/slides/slide23.xml><?xml version="1.0" encoding="utf-8"?>
+<p:sld xmlns:a="http://schemas.openxmlformats.org/drawingml/2006/main" xmlns:r="http://schemas.openxmlformats.org/officeDocument/2006/relationships" xmlns:p="http://schemas.openxmlformats.org/presentationml/2006/main">
+  <p:cSld>
+    <p:spTree>
+      <p:nvGrpSpPr>
+        <p:cNvPr id="1" name=""/>
+        <p:cNvGrpSpPr/>
+        <p:nvPr/>
+      </p:nvGrpSpPr>
+      <p:grpSpPr>
+        <a:xfrm>
+          <a:off x="0" y="0"/>
+          <a:ext cx="0" cy="0"/>
+          <a:chOff x="0" y="0"/>
+          <a:chExt cx="0" cy="0"/>
+        </a:xfrm>
+      </p:grpSpPr>
+      <p:sp>
+        <p:nvSpPr>
+          <p:cNvPr id="2" name="Title 1"/>
+          <p:cNvSpPr>
+            <a:spLocks noGrp="1"/>
+          </p:cNvSpPr>
+          <p:nvPr>
+            <p:ph type="title"/>
+          </p:nvPr>
+        </p:nvSpPr>
+        <p:spPr/>
+        <p:txBody>
+          <a:bodyPr/>
+          <a:lstStyle/>
+          <a:p>
+            <a:r>
+              <a:rPr lang="en-US" dirty="0" smtClean="0"/>
+              <a:t>HARDWARE MANAGEMENT</a:t>
+            </a:r>
+            <a:endParaRPr lang="en-IN" dirty="0"/>
+          </a:p>
+        </p:txBody>
+      </p:sp>
+      <p:sp>
+        <p:nvSpPr>
+          <p:cNvPr id="3" name="Content Placeholder 2"/>
+          <p:cNvSpPr>
+            <a:spLocks noGrp="1"/>
+          </p:cNvSpPr>
+          <p:nvPr>
+            <p:ph idx="1"/>
+          </p:nvPr>
+        </p:nvSpPr>
+        <p:spPr/>
+        <p:txBody>
+          <a:bodyPr/>
+          <a:lstStyle/>
+          <a:p>
+            <a:endParaRPr lang="en-IN"/>
+          </a:p>
+        </p:txBody>
+      </p:sp>
+    </p:spTree>
+    <p:extLst>
+      <p:ext uri="{BB962C8B-B14F-4D97-AF65-F5344CB8AC3E}">
+        <p14:creationId xmlns:p14="http://schemas.microsoft.com/office/powerpoint/2010/main" val="2907784962"/>
+      </p:ext>
+    </p:extLst>
+  </p:cSld>
+  <p:clrMapOvr>
+    <a:masterClrMapping/>
+  </p:clrMapOvr>
+</p:sld>
+</file>
+
+<file path=ppt/slides/slide24.xml><?xml version="1.0" encoding="utf-8"?>
+<p:sld xmlns:a="http://schemas.openxmlformats.org/drawingml/2006/main" xmlns:r="http://schemas.openxmlformats.org/officeDocument/2006/relationships" xmlns:p="http://schemas.openxmlformats.org/presentationml/2006/main">
+  <p:cSld>
+    <p:spTree>
+      <p:nvGrpSpPr>
+        <p:cNvPr id="1" name=""/>
+        <p:cNvGrpSpPr/>
+        <p:nvPr/>
+      </p:nvGrpSpPr>
+      <p:grpSpPr>
+        <a:xfrm>
+          <a:off x="0" y="0"/>
+          <a:ext cx="0" cy="0"/>
+          <a:chOff x="0" y="0"/>
+          <a:chExt cx="0" cy="0"/>
+        </a:xfrm>
+      </p:grpSpPr>
+      <p:sp>
+        <p:nvSpPr>
+          <p:cNvPr id="2" name="Title 1"/>
+          <p:cNvSpPr>
+            <a:spLocks noGrp="1"/>
+          </p:cNvSpPr>
+          <p:nvPr>
+            <p:ph type="title"/>
+          </p:nvPr>
+        </p:nvSpPr>
+        <p:spPr/>
+        <p:txBody>
+          <a:bodyPr/>
+          <a:lstStyle/>
+          <a:p>
+            <a:r>
+              <a:rPr lang="en-US" dirty="0" smtClean="0"/>
+              <a:t>INTERRUPT HANDLING</a:t>
+            </a:r>
+            <a:endParaRPr lang="en-IN" dirty="0"/>
+          </a:p>
+        </p:txBody>
+      </p:sp>
+      <p:sp>
+        <p:nvSpPr>
+          <p:cNvPr id="3" name="Content Placeholder 2"/>
+          <p:cNvSpPr>
+            <a:spLocks noGrp="1"/>
+          </p:cNvSpPr>
+          <p:nvPr>
+            <p:ph idx="1"/>
+          </p:nvPr>
+        </p:nvSpPr>
+        <p:spPr/>
+        <p:txBody>
+          <a:bodyPr/>
+          <a:lstStyle/>
+          <a:p>
+            <a:endParaRPr lang="en-IN"/>
+          </a:p>
+        </p:txBody>
+      </p:sp>
+    </p:spTree>
+    <p:extLst>
+      <p:ext uri="{BB962C8B-B14F-4D97-AF65-F5344CB8AC3E}">
+        <p14:creationId xmlns:p14="http://schemas.microsoft.com/office/powerpoint/2010/main" val="2521435045"/>
+      </p:ext>
+    </p:extLst>
+  </p:cSld>
+  <p:clrMapOvr>
+    <a:masterClrMapping/>
+  </p:clrMapOvr>
+</p:sld>
+</file>
+
+<file path=ppt/slides/slide25.xml><?xml version="1.0" encoding="utf-8"?>
+<p:sld xmlns:a="http://schemas.openxmlformats.org/drawingml/2006/main" xmlns:r="http://schemas.openxmlformats.org/officeDocument/2006/relationships" xmlns:p="http://schemas.openxmlformats.org/presentationml/2006/main">
+  <p:cSld>
+    <p:spTree>
+      <p:nvGrpSpPr>
+        <p:cNvPr id="1" name=""/>
+        <p:cNvGrpSpPr/>
+        <p:nvPr/>
+      </p:nvGrpSpPr>
+      <p:grpSpPr>
+        <a:xfrm>
+          <a:off x="0" y="0"/>
+          <a:ext cx="0" cy="0"/>
+          <a:chOff x="0" y="0"/>
+          <a:chExt cx="0" cy="0"/>
+        </a:xfrm>
+      </p:grpSpPr>
+      <p:sp>
+        <p:nvSpPr>
+          <p:cNvPr id="2" name="Title 1"/>
+          <p:cNvSpPr>
+            <a:spLocks noGrp="1"/>
+          </p:cNvSpPr>
+          <p:nvPr>
+            <p:ph type="title"/>
+          </p:nvPr>
+        </p:nvSpPr>
+        <p:spPr/>
+        <p:txBody>
+          <a:bodyPr/>
+          <a:lstStyle/>
+          <a:p>
+            <a:r>
+              <a:rPr lang="en-US" dirty="0" smtClean="0"/>
+              <a:t>CONCORRENCY AND RICE CONDITION</a:t>
+            </a:r>
+            <a:endParaRPr lang="en-IN" dirty="0"/>
+          </a:p>
+        </p:txBody>
+      </p:sp>
+      <p:sp>
+        <p:nvSpPr>
+          <p:cNvPr id="3" name="Content Placeholder 2"/>
+          <p:cNvSpPr>
+            <a:spLocks noGrp="1"/>
+          </p:cNvSpPr>
+          <p:nvPr>
+            <p:ph idx="1"/>
+          </p:nvPr>
+        </p:nvSpPr>
+        <p:spPr/>
+        <p:txBody>
+          <a:bodyPr/>
+          <a:lstStyle/>
+          <a:p>
+            <a:endParaRPr lang="en-IN"/>
+          </a:p>
+        </p:txBody>
+      </p:sp>
+    </p:spTree>
+    <p:extLst>
+      <p:ext uri="{BB962C8B-B14F-4D97-AF65-F5344CB8AC3E}">
+        <p14:creationId xmlns:p14="http://schemas.microsoft.com/office/powerpoint/2010/main" val="2958807930"/>
+      </p:ext>
+    </p:extLst>
+  </p:cSld>
+  <p:clrMapOvr>
+    <a:masterClrMapping/>
+  </p:clrMapOvr>
+</p:sld>
+</file>
+
+<file path=ppt/slides/slide26.xml><?xml version="1.0" encoding="utf-8"?>
+<p:sld xmlns:a="http://schemas.openxmlformats.org/drawingml/2006/main" xmlns:r="http://schemas.openxmlformats.org/officeDocument/2006/relationships" xmlns:p="http://schemas.openxmlformats.org/presentationml/2006/main">
+  <p:cSld>
+    <p:spTree>
+      <p:nvGrpSpPr>
+        <p:cNvPr id="1" name=""/>
+        <p:cNvGrpSpPr/>
+        <p:nvPr/>
+      </p:nvGrpSpPr>
+      <p:grpSpPr>
+        <a:xfrm>
+          <a:off x="0" y="0"/>
+          <a:ext cx="0" cy="0"/>
+          <a:chOff x="0" y="0"/>
+          <a:chExt cx="0" cy="0"/>
+        </a:xfrm>
+      </p:grpSpPr>
+      <p:sp>
+        <p:nvSpPr>
+          <p:cNvPr id="2" name="Title 1"/>
+          <p:cNvSpPr>
+            <a:spLocks noGrp="1"/>
+          </p:cNvSpPr>
+          <p:nvPr>
+            <p:ph type="title"/>
+          </p:nvPr>
+        </p:nvSpPr>
+        <p:spPr/>
+        <p:txBody>
+          <a:bodyPr/>
+          <a:lstStyle/>
+          <a:p>
+            <a:r>
+              <a:rPr lang="en-US" dirty="0" smtClean="0"/>
+              <a:t>USB DEVICES</a:t>
+            </a:r>
+            <a:endParaRPr lang="en-IN" dirty="0"/>
+          </a:p>
+        </p:txBody>
+      </p:sp>
+      <p:sp>
+        <p:nvSpPr>
+          <p:cNvPr id="3" name="Content Placeholder 2"/>
+          <p:cNvSpPr>
+            <a:spLocks noGrp="1"/>
+          </p:cNvSpPr>
+          <p:nvPr>
+            <p:ph idx="1"/>
+          </p:nvPr>
+        </p:nvSpPr>
+        <p:spPr/>
+        <p:txBody>
+          <a:bodyPr/>
+          <a:lstStyle/>
+          <a:p>
+            <a:endParaRPr lang="en-IN"/>
+          </a:p>
+        </p:txBody>
+      </p:sp>
+    </p:spTree>
+    <p:extLst>
+      <p:ext uri="{BB962C8B-B14F-4D97-AF65-F5344CB8AC3E}">
+        <p14:creationId xmlns:p14="http://schemas.microsoft.com/office/powerpoint/2010/main" val="1115652092"/>
+      </p:ext>
+    </p:extLst>
+  </p:cSld>
+  <p:clrMapOvr>
+    <a:masterClrMapping/>
+  </p:clrMapOvr>
+</p:sld>
+</file>
+
+<file path=ppt/slides/slide27.xml><?xml version="1.0" encoding="utf-8"?>
+<p:sld xmlns:a="http://schemas.openxmlformats.org/drawingml/2006/main" xmlns:r="http://schemas.openxmlformats.org/officeDocument/2006/relationships" xmlns:p="http://schemas.openxmlformats.org/presentationml/2006/main">
+  <p:cSld>
+    <p:spTree>
+      <p:nvGrpSpPr>
+        <p:cNvPr id="1" name=""/>
+        <p:cNvGrpSpPr/>
+        <p:nvPr/>
+      </p:nvGrpSpPr>
+      <p:grpSpPr>
+        <a:xfrm>
+          <a:off x="0" y="0"/>
+          <a:ext cx="0" cy="0"/>
+          <a:chOff x="0" y="0"/>
+          <a:chExt cx="0" cy="0"/>
+        </a:xfrm>
+      </p:grpSpPr>
+      <p:sp>
+        <p:nvSpPr>
+          <p:cNvPr id="2" name="Title 1"/>
+          <p:cNvSpPr>
+            <a:spLocks noGrp="1"/>
+          </p:cNvSpPr>
+          <p:nvPr>
+            <p:ph type="title"/>
+          </p:nvPr>
+        </p:nvSpPr>
+        <p:spPr/>
+        <p:txBody>
+          <a:bodyPr/>
+          <a:lstStyle/>
+          <a:p>
+            <a:r>
+              <a:rPr lang="en-US" dirty="0" smtClean="0"/>
+              <a:t>BLOCK DEVICES</a:t>
+            </a:r>
+            <a:endParaRPr lang="en-IN" dirty="0"/>
+          </a:p>
+        </p:txBody>
+      </p:sp>
+      <p:sp>
+        <p:nvSpPr>
+          <p:cNvPr id="3" name="Content Placeholder 2"/>
+          <p:cNvSpPr>
+            <a:spLocks noGrp="1"/>
+          </p:cNvSpPr>
+          <p:nvPr>
+            <p:ph idx="1"/>
+          </p:nvPr>
+        </p:nvSpPr>
+        <p:spPr/>
+        <p:txBody>
+          <a:bodyPr/>
+          <a:lstStyle/>
+          <a:p>
+            <a:endParaRPr lang="en-IN"/>
+          </a:p>
+        </p:txBody>
+      </p:sp>
+    </p:spTree>
+    <p:extLst>
+      <p:ext uri="{BB962C8B-B14F-4D97-AF65-F5344CB8AC3E}">
+        <p14:creationId xmlns:p14="http://schemas.microsoft.com/office/powerpoint/2010/main" val="3028707880"/>
+      </p:ext>
+    </p:extLst>
+  </p:cSld>
+  <p:clrMapOvr>
+    <a:masterClrMapping/>
+  </p:clrMapOvr>
+</p:sld>
+</file>
+
+<file path=ppt/slides/slide28.xml><?xml version="1.0" encoding="utf-8"?>
+<p:sld xmlns:a="http://schemas.openxmlformats.org/drawingml/2006/main" xmlns:r="http://schemas.openxmlformats.org/officeDocument/2006/relationships" xmlns:p="http://schemas.openxmlformats.org/presentationml/2006/main">
+  <p:cSld>
+    <p:spTree>
+      <p:nvGrpSpPr>
+        <p:cNvPr id="1" name=""/>
+        <p:cNvGrpSpPr/>
+        <p:nvPr/>
+      </p:nvGrpSpPr>
+      <p:grpSpPr>
+        <a:xfrm>
+          <a:off x="0" y="0"/>
+          <a:ext cx="0" cy="0"/>
+          <a:chOff x="0" y="0"/>
+          <a:chExt cx="0" cy="0"/>
+        </a:xfrm>
+      </p:grpSpPr>
+      <p:sp>
+        <p:nvSpPr>
+          <p:cNvPr id="2" name="Title 1"/>
+          <p:cNvSpPr>
+            <a:spLocks noGrp="1"/>
+          </p:cNvSpPr>
+          <p:nvPr>
+            <p:ph type="title"/>
+          </p:nvPr>
+        </p:nvSpPr>
+        <p:spPr/>
+        <p:txBody>
+          <a:bodyPr/>
+          <a:lstStyle/>
+          <a:p>
+            <a:r>
+              <a:rPr lang="en-US" dirty="0" smtClean="0"/>
+              <a:t>PCI INTERFACE</a:t>
+            </a:r>
+            <a:endParaRPr lang="en-IN" dirty="0"/>
+          </a:p>
+        </p:txBody>
+      </p:sp>
+      <p:sp>
+        <p:nvSpPr>
+          <p:cNvPr id="3" name="Content Placeholder 2"/>
+          <p:cNvSpPr>
+            <a:spLocks noGrp="1"/>
+          </p:cNvSpPr>
+          <p:nvPr>
+            <p:ph idx="1"/>
+          </p:nvPr>
+        </p:nvSpPr>
+        <p:spPr/>
+        <p:txBody>
+          <a:bodyPr/>
+          <a:lstStyle/>
+          <a:p>
+            <a:endParaRPr lang="en-IN"/>
+          </a:p>
+        </p:txBody>
+      </p:sp>
+    </p:spTree>
+    <p:extLst>
+      <p:ext uri="{BB962C8B-B14F-4D97-AF65-F5344CB8AC3E}">
+        <p14:creationId xmlns:p14="http://schemas.microsoft.com/office/powerpoint/2010/main" val="1666987590"/>
+      </p:ext>
+    </p:extLst>
+  </p:cSld>
+  <p:clrMapOvr>
+    <a:masterClrMapping/>
+  </p:clrMapOvr>
+</p:sld>
+</file>
+
+<file path=ppt/slides/slide29.xml><?xml version="1.0" encoding="utf-8"?>
+<p:sld xmlns:a="http://schemas.openxmlformats.org/drawingml/2006/main" xmlns:r="http://schemas.openxmlformats.org/officeDocument/2006/relationships" xmlns:p="http://schemas.openxmlformats.org/presentationml/2006/main">
+  <p:cSld>
+    <p:spTree>
+      <p:nvGrpSpPr>
+        <p:cNvPr id="1" name=""/>
+        <p:cNvGrpSpPr/>
+        <p:nvPr/>
+      </p:nvGrpSpPr>
+      <p:grpSpPr>
+        <a:xfrm>
+          <a:off x="0" y="0"/>
+          <a:ext cx="0" cy="0"/>
+          <a:chOff x="0" y="0"/>
+          <a:chExt cx="0" cy="0"/>
+        </a:xfrm>
+      </p:grpSpPr>
+      <p:sp>
+        <p:nvSpPr>
+          <p:cNvPr id="2" name="Title 1"/>
+          <p:cNvSpPr>
+            <a:spLocks noGrp="1"/>
+          </p:cNvSpPr>
+          <p:nvPr>
+            <p:ph type="title"/>
+          </p:nvPr>
+        </p:nvSpPr>
+        <p:spPr/>
+        <p:txBody>
+          <a:bodyPr/>
+          <a:lstStyle/>
+          <a:p>
+            <a:r>
+              <a:rPr lang="en-US" dirty="0" smtClean="0"/>
+              <a:t>LINUX DEVICE MODEL</a:t>
+            </a:r>
+            <a:endParaRPr lang="en-IN" dirty="0"/>
+          </a:p>
+        </p:txBody>
+      </p:sp>
+      <p:sp>
+        <p:nvSpPr>
+          <p:cNvPr id="3" name="Content Placeholder 2"/>
+          <p:cNvSpPr>
+            <a:spLocks noGrp="1"/>
+          </p:cNvSpPr>
+          <p:nvPr>
+            <p:ph idx="1"/>
+          </p:nvPr>
+        </p:nvSpPr>
+        <p:spPr/>
+        <p:txBody>
+          <a:bodyPr/>
+          <a:lstStyle/>
+          <a:p>
+            <a:endParaRPr lang="en-IN"/>
+          </a:p>
+        </p:txBody>
+      </p:sp>
+    </p:spTree>
+    <p:extLst>
+      <p:ext uri="{BB962C8B-B14F-4D97-AF65-F5344CB8AC3E}">
+        <p14:creationId xmlns:p14="http://schemas.microsoft.com/office/powerpoint/2010/main" val="2790520241"/>
+      </p:ext>
+    </p:extLst>
+  </p:cSld>
+  <p:clrMapOvr>
+    <a:masterClrMapping/>
+  </p:clrMapOvr>
+</p:sld>
+</file>
+
 <file path=ppt/slides/slide3.xml><?xml version="1.0" encoding="utf-8"?>
 <p:sld xmlns:a="http://schemas.openxmlformats.org/drawingml/2006/main" xmlns:r="http://schemas.openxmlformats.org/officeDocument/2006/relationships" xmlns:p="http://schemas.openxmlformats.org/presentationml/2006/main">
   <p:cSld>
@@ -11778,39 +12689,325 @@
           <a:bodyPr/>
           <a:lstStyle/>
           <a:p>
-            <a:endParaRPr lang="en-IN"/>
+            <a:r>
+              <a:rPr lang="en-US" dirty="0" smtClean="0"/>
+              <a:t>What is driver?</a:t>
+            </a:r>
+            <a:endParaRPr lang="en-IN" dirty="0"/>
           </a:p>
         </p:txBody>
       </p:sp>
-      <p:graphicFrame>
-        <p:nvGraphicFramePr>
-          <p:cNvPr id="4" name="Content Placeholder 3"/>
-          <p:cNvGraphicFramePr>
-            <a:graphicFrameLocks noGrp="1"/>
-          </p:cNvGraphicFramePr>
+      <p:sp>
+        <p:nvSpPr>
+          <p:cNvPr id="3" name="Content Placeholder 2"/>
+          <p:cNvSpPr>
+            <a:spLocks noGrp="1"/>
+          </p:cNvSpPr>
           <p:nvPr>
             <p:ph idx="1"/>
-            <p:extLst>
-              <p:ext uri="{D42A27DB-BD31-4B8C-83A1-F6EECF244321}">
-                <p14:modId xmlns:p14="http://schemas.microsoft.com/office/powerpoint/2010/main" val="272219533"/>
-              </p:ext>
-            </p:extLst>
           </p:nvPr>
-        </p:nvGraphicFramePr>
-        <p:xfrm>
-          <a:off x="838200" y="1825625"/>
-          <a:ext cx="8636000" cy="2593975"/>
-        </p:xfrm>
-        <a:graphic>
-          <a:graphicData uri="http://schemas.openxmlformats.org/drawingml/2006/diagram">
-            <dgm:relIds xmlns:dgm="http://schemas.openxmlformats.org/drawingml/2006/diagram" xmlns:r="http://schemas.openxmlformats.org/officeDocument/2006/relationships" r:dm="rId2" r:lo="rId3" r:qs="rId4" r:cs="rId5"/>
-          </a:graphicData>
-        </a:graphic>
-      </p:graphicFrame>
+        </p:nvSpPr>
+        <p:spPr/>
+        <p:txBody>
+          <a:bodyPr/>
+          <a:lstStyle/>
+          <a:p>
+            <a:endParaRPr lang="en-IN"/>
+          </a:p>
+        </p:txBody>
+      </p:sp>
     </p:spTree>
     <p:extLst>
       <p:ext uri="{BB962C8B-B14F-4D97-AF65-F5344CB8AC3E}">
-        <p14:creationId xmlns:p14="http://schemas.microsoft.com/office/powerpoint/2010/main" val="1001706900"/>
+        <p14:creationId xmlns:p14="http://schemas.microsoft.com/office/powerpoint/2010/main" val="775787897"/>
+      </p:ext>
+    </p:extLst>
+  </p:cSld>
+  <p:clrMapOvr>
+    <a:masterClrMapping/>
+  </p:clrMapOvr>
+</p:sld>
+</file>
+
+<file path=ppt/slides/slide30.xml><?xml version="1.0" encoding="utf-8"?>
+<p:sld xmlns:a="http://schemas.openxmlformats.org/drawingml/2006/main" xmlns:r="http://schemas.openxmlformats.org/officeDocument/2006/relationships" xmlns:p="http://schemas.openxmlformats.org/presentationml/2006/main">
+  <p:cSld>
+    <p:spTree>
+      <p:nvGrpSpPr>
+        <p:cNvPr id="1" name=""/>
+        <p:cNvGrpSpPr/>
+        <p:nvPr/>
+      </p:nvGrpSpPr>
+      <p:grpSpPr>
+        <a:xfrm>
+          <a:off x="0" y="0"/>
+          <a:ext cx="0" cy="0"/>
+          <a:chOff x="0" y="0"/>
+          <a:chExt cx="0" cy="0"/>
+        </a:xfrm>
+      </p:grpSpPr>
+      <p:sp>
+        <p:nvSpPr>
+          <p:cNvPr id="2" name="Title 1"/>
+          <p:cNvSpPr>
+            <a:spLocks noGrp="1"/>
+          </p:cNvSpPr>
+          <p:nvPr>
+            <p:ph type="title"/>
+          </p:nvPr>
+        </p:nvSpPr>
+        <p:spPr/>
+        <p:txBody>
+          <a:bodyPr/>
+          <a:lstStyle/>
+          <a:p>
+            <a:r>
+              <a:rPr lang="en-US" dirty="0" smtClean="0"/>
+              <a:t>LINUX KERNEL BUILD AND STATIC LINKING</a:t>
+            </a:r>
+            <a:endParaRPr lang="en-IN" dirty="0"/>
+          </a:p>
+        </p:txBody>
+      </p:sp>
+      <p:sp>
+        <p:nvSpPr>
+          <p:cNvPr id="3" name="Content Placeholder 2"/>
+          <p:cNvSpPr>
+            <a:spLocks noGrp="1"/>
+          </p:cNvSpPr>
+          <p:nvPr>
+            <p:ph idx="1"/>
+          </p:nvPr>
+        </p:nvSpPr>
+        <p:spPr/>
+        <p:txBody>
+          <a:bodyPr/>
+          <a:lstStyle/>
+          <a:p>
+            <a:endParaRPr lang="en-IN"/>
+          </a:p>
+        </p:txBody>
+      </p:sp>
+    </p:spTree>
+    <p:extLst>
+      <p:ext uri="{BB962C8B-B14F-4D97-AF65-F5344CB8AC3E}">
+        <p14:creationId xmlns:p14="http://schemas.microsoft.com/office/powerpoint/2010/main" val="3827052536"/>
+      </p:ext>
+    </p:extLst>
+  </p:cSld>
+  <p:clrMapOvr>
+    <a:masterClrMapping/>
+  </p:clrMapOvr>
+</p:sld>
+</file>
+
+<file path=ppt/slides/slide31.xml><?xml version="1.0" encoding="utf-8"?>
+<p:sld xmlns:a="http://schemas.openxmlformats.org/drawingml/2006/main" xmlns:r="http://schemas.openxmlformats.org/officeDocument/2006/relationships" xmlns:p="http://schemas.openxmlformats.org/presentationml/2006/main">
+  <p:cSld>
+    <p:spTree>
+      <p:nvGrpSpPr>
+        <p:cNvPr id="1" name=""/>
+        <p:cNvGrpSpPr/>
+        <p:nvPr/>
+      </p:nvGrpSpPr>
+      <p:grpSpPr>
+        <a:xfrm>
+          <a:off x="0" y="0"/>
+          <a:ext cx="0" cy="0"/>
+          <a:chOff x="0" y="0"/>
+          <a:chExt cx="0" cy="0"/>
+        </a:xfrm>
+      </p:grpSpPr>
+      <p:sp>
+        <p:nvSpPr>
+          <p:cNvPr id="2" name="Title 1"/>
+          <p:cNvSpPr>
+            <a:spLocks noGrp="1"/>
+          </p:cNvSpPr>
+          <p:nvPr>
+            <p:ph type="title"/>
+          </p:nvPr>
+        </p:nvSpPr>
+        <p:spPr/>
+        <p:txBody>
+          <a:bodyPr/>
+          <a:lstStyle/>
+          <a:p>
+            <a:r>
+              <a:rPr lang="en-US" dirty="0" smtClean="0"/>
+              <a:t>SERIAL PORT</a:t>
+            </a:r>
+            <a:endParaRPr lang="en-IN" dirty="0"/>
+          </a:p>
+        </p:txBody>
+      </p:sp>
+      <p:sp>
+        <p:nvSpPr>
+          <p:cNvPr id="3" name="Content Placeholder 2"/>
+          <p:cNvSpPr>
+            <a:spLocks noGrp="1"/>
+          </p:cNvSpPr>
+          <p:nvPr>
+            <p:ph idx="1"/>
+          </p:nvPr>
+        </p:nvSpPr>
+        <p:spPr/>
+        <p:txBody>
+          <a:bodyPr/>
+          <a:lstStyle/>
+          <a:p>
+            <a:endParaRPr lang="en-IN"/>
+          </a:p>
+        </p:txBody>
+      </p:sp>
+    </p:spTree>
+    <p:extLst>
+      <p:ext uri="{BB962C8B-B14F-4D97-AF65-F5344CB8AC3E}">
+        <p14:creationId xmlns:p14="http://schemas.microsoft.com/office/powerpoint/2010/main" val="2655153619"/>
+      </p:ext>
+    </p:extLst>
+  </p:cSld>
+  <p:clrMapOvr>
+    <a:masterClrMapping/>
+  </p:clrMapOvr>
+</p:sld>
+</file>
+
+<file path=ppt/slides/slide32.xml><?xml version="1.0" encoding="utf-8"?>
+<p:sld xmlns:a="http://schemas.openxmlformats.org/drawingml/2006/main" xmlns:r="http://schemas.openxmlformats.org/officeDocument/2006/relationships" xmlns:p="http://schemas.openxmlformats.org/presentationml/2006/main">
+  <p:cSld>
+    <p:spTree>
+      <p:nvGrpSpPr>
+        <p:cNvPr id="1" name=""/>
+        <p:cNvGrpSpPr/>
+        <p:nvPr/>
+      </p:nvGrpSpPr>
+      <p:grpSpPr>
+        <a:xfrm>
+          <a:off x="0" y="0"/>
+          <a:ext cx="0" cy="0"/>
+          <a:chOff x="0" y="0"/>
+          <a:chExt cx="0" cy="0"/>
+        </a:xfrm>
+      </p:grpSpPr>
+      <p:sp>
+        <p:nvSpPr>
+          <p:cNvPr id="2" name="Title 1"/>
+          <p:cNvSpPr>
+            <a:spLocks noGrp="1"/>
+          </p:cNvSpPr>
+          <p:nvPr>
+            <p:ph type="title"/>
+          </p:nvPr>
+        </p:nvSpPr>
+        <p:spPr/>
+        <p:txBody>
+          <a:bodyPr/>
+          <a:lstStyle/>
+          <a:p>
+            <a:r>
+              <a:rPr lang="en-US" dirty="0" smtClean="0"/>
+              <a:t>PARALLEL PORT</a:t>
+            </a:r>
+            <a:endParaRPr lang="en-IN" dirty="0"/>
+          </a:p>
+        </p:txBody>
+      </p:sp>
+      <p:sp>
+        <p:nvSpPr>
+          <p:cNvPr id="3" name="Content Placeholder 2"/>
+          <p:cNvSpPr>
+            <a:spLocks noGrp="1"/>
+          </p:cNvSpPr>
+          <p:nvPr>
+            <p:ph idx="1"/>
+          </p:nvPr>
+        </p:nvSpPr>
+        <p:spPr/>
+        <p:txBody>
+          <a:bodyPr/>
+          <a:lstStyle/>
+          <a:p>
+            <a:endParaRPr lang="en-IN"/>
+          </a:p>
+        </p:txBody>
+      </p:sp>
+    </p:spTree>
+    <p:extLst>
+      <p:ext uri="{BB962C8B-B14F-4D97-AF65-F5344CB8AC3E}">
+        <p14:creationId xmlns:p14="http://schemas.microsoft.com/office/powerpoint/2010/main" val="3805137301"/>
+      </p:ext>
+    </p:extLst>
+  </p:cSld>
+  <p:clrMapOvr>
+    <a:masterClrMapping/>
+  </p:clrMapOvr>
+</p:sld>
+</file>
+
+<file path=ppt/slides/slide33.xml><?xml version="1.0" encoding="utf-8"?>
+<p:sld xmlns:a="http://schemas.openxmlformats.org/drawingml/2006/main" xmlns:r="http://schemas.openxmlformats.org/officeDocument/2006/relationships" xmlns:p="http://schemas.openxmlformats.org/presentationml/2006/main">
+  <p:cSld>
+    <p:spTree>
+      <p:nvGrpSpPr>
+        <p:cNvPr id="1" name=""/>
+        <p:cNvGrpSpPr/>
+        <p:nvPr/>
+      </p:nvGrpSpPr>
+      <p:grpSpPr>
+        <a:xfrm>
+          <a:off x="0" y="0"/>
+          <a:ext cx="0" cy="0"/>
+          <a:chOff x="0" y="0"/>
+          <a:chExt cx="0" cy="0"/>
+        </a:xfrm>
+      </p:grpSpPr>
+      <p:sp>
+        <p:nvSpPr>
+          <p:cNvPr id="2" name="Title 1"/>
+          <p:cNvSpPr>
+            <a:spLocks noGrp="1"/>
+          </p:cNvSpPr>
+          <p:nvPr>
+            <p:ph type="title"/>
+          </p:nvPr>
+        </p:nvSpPr>
+        <p:spPr/>
+        <p:txBody>
+          <a:bodyPr/>
+          <a:lstStyle/>
+          <a:p>
+            <a:r>
+              <a:rPr lang="en-US" dirty="0" smtClean="0"/>
+              <a:t>BEAGLE BONE BLACK</a:t>
+            </a:r>
+            <a:endParaRPr lang="en-IN" dirty="0"/>
+          </a:p>
+        </p:txBody>
+      </p:sp>
+      <p:sp>
+        <p:nvSpPr>
+          <p:cNvPr id="3" name="Content Placeholder 2"/>
+          <p:cNvSpPr>
+            <a:spLocks noGrp="1"/>
+          </p:cNvSpPr>
+          <p:nvPr>
+            <p:ph idx="1"/>
+          </p:nvPr>
+        </p:nvSpPr>
+        <p:spPr/>
+        <p:txBody>
+          <a:bodyPr/>
+          <a:lstStyle/>
+          <a:p>
+            <a:endParaRPr lang="en-IN"/>
+          </a:p>
+        </p:txBody>
+      </p:sp>
+    </p:spTree>
+    <p:extLst>
+      <p:ext uri="{BB962C8B-B14F-4D97-AF65-F5344CB8AC3E}">
+        <p14:creationId xmlns:p14="http://schemas.microsoft.com/office/powerpoint/2010/main" val="2923373928"/>
       </p:ext>
     </p:extLst>
   </p:cSld>
@@ -11854,41 +13051,35 @@
           <a:p>
             <a:r>
               <a:rPr lang="en-US" dirty="0" smtClean="0"/>
-              <a:t>CHARACTER DRIVERS</a:t>
+              <a:t>Why should we need a driver?</a:t>
             </a:r>
             <a:endParaRPr lang="en-IN" dirty="0"/>
           </a:p>
         </p:txBody>
       </p:sp>
-      <p:graphicFrame>
-        <p:nvGraphicFramePr>
-          <p:cNvPr id="4" name="Content Placeholder 3"/>
-          <p:cNvGraphicFramePr>
-            <a:graphicFrameLocks noGrp="1"/>
-          </p:cNvGraphicFramePr>
+      <p:sp>
+        <p:nvSpPr>
+          <p:cNvPr id="3" name="Content Placeholder 2"/>
+          <p:cNvSpPr>
+            <a:spLocks noGrp="1"/>
+          </p:cNvSpPr>
           <p:nvPr>
             <p:ph idx="1"/>
-            <p:extLst>
-              <p:ext uri="{D42A27DB-BD31-4B8C-83A1-F6EECF244321}">
-                <p14:modId xmlns:p14="http://schemas.microsoft.com/office/powerpoint/2010/main" val="828305667"/>
-              </p:ext>
-            </p:extLst>
           </p:nvPr>
-        </p:nvGraphicFramePr>
-        <p:xfrm>
-          <a:off x="838200" y="1825625"/>
-          <a:ext cx="10515600" cy="4351338"/>
-        </p:xfrm>
-        <a:graphic>
-          <a:graphicData uri="http://schemas.openxmlformats.org/drawingml/2006/diagram">
-            <dgm:relIds xmlns:dgm="http://schemas.openxmlformats.org/drawingml/2006/diagram" xmlns:r="http://schemas.openxmlformats.org/officeDocument/2006/relationships" r:dm="rId2" r:lo="rId3" r:qs="rId4" r:cs="rId5"/>
-          </a:graphicData>
-        </a:graphic>
-      </p:graphicFrame>
+        </p:nvSpPr>
+        <p:spPr/>
+        <p:txBody>
+          <a:bodyPr/>
+          <a:lstStyle/>
+          <a:p>
+            <a:endParaRPr lang="en-IN"/>
+          </a:p>
+        </p:txBody>
+      </p:sp>
     </p:spTree>
     <p:extLst>
       <p:ext uri="{BB962C8B-B14F-4D97-AF65-F5344CB8AC3E}">
-        <p14:creationId xmlns:p14="http://schemas.microsoft.com/office/powerpoint/2010/main" val="3205233571"/>
+        <p14:creationId xmlns:p14="http://schemas.microsoft.com/office/powerpoint/2010/main" val="1988497486"/>
       </p:ext>
     </p:extLst>
   </p:cSld>
@@ -11932,7 +13123,7 @@
           <a:p>
             <a:r>
               <a:rPr lang="en-US" dirty="0" smtClean="0"/>
-              <a:t>ADVANCED CHARACTER DRIVER OPERATIONS</a:t>
+              <a:t>Advantages of device driver:</a:t>
             </a:r>
             <a:endParaRPr lang="en-IN" dirty="0"/>
           </a:p>
@@ -11953,25 +13144,14 @@
           <a:bodyPr/>
           <a:lstStyle/>
           <a:p>
-            <a:r>
-              <a:rPr lang="en-US" dirty="0" err="1" smtClean="0"/>
-              <a:t>Lseek</a:t>
-            </a:r>
-            <a:endParaRPr lang="en-US" dirty="0" smtClean="0"/>
-          </a:p>
-          <a:p>
-            <a:r>
-              <a:rPr lang="en-US" dirty="0" err="1" smtClean="0"/>
-              <a:t>ioctl</a:t>
-            </a:r>
-            <a:endParaRPr lang="en-IN" dirty="0"/>
+            <a:endParaRPr lang="en-IN"/>
           </a:p>
         </p:txBody>
       </p:sp>
     </p:spTree>
     <p:extLst>
       <p:ext uri="{BB962C8B-B14F-4D97-AF65-F5344CB8AC3E}">
-        <p14:creationId xmlns:p14="http://schemas.microsoft.com/office/powerpoint/2010/main" val="1391139471"/>
+        <p14:creationId xmlns:p14="http://schemas.microsoft.com/office/powerpoint/2010/main" val="4156680621"/>
       </p:ext>
     </p:extLst>
   </p:cSld>
@@ -12015,7 +13195,7 @@
           <a:p>
             <a:r>
               <a:rPr lang="en-US" dirty="0" smtClean="0"/>
-              <a:t>FLOW OF TIME</a:t>
+              <a:t>Types of Drivers:</a:t>
             </a:r>
             <a:endParaRPr lang="en-IN" dirty="0"/>
           </a:p>
@@ -12043,7 +13223,7 @@
     </p:spTree>
     <p:extLst>
       <p:ext uri="{BB962C8B-B14F-4D97-AF65-F5344CB8AC3E}">
-        <p14:creationId xmlns:p14="http://schemas.microsoft.com/office/powerpoint/2010/main" val="92878347"/>
+        <p14:creationId xmlns:p14="http://schemas.microsoft.com/office/powerpoint/2010/main" val="2761242267"/>
       </p:ext>
     </p:extLst>
   </p:cSld>
@@ -12087,7 +13267,7 @@
           <a:p>
             <a:r>
               <a:rPr lang="en-US" dirty="0" smtClean="0"/>
-              <a:t>HARDWARE MANAGEMENT</a:t>
+              <a:t>Kernel versioning:</a:t>
             </a:r>
             <a:endParaRPr lang="en-IN" dirty="0"/>
           </a:p>
@@ -12115,7 +13295,7 @@
     </p:spTree>
     <p:extLst>
       <p:ext uri="{BB962C8B-B14F-4D97-AF65-F5344CB8AC3E}">
-        <p14:creationId xmlns:p14="http://schemas.microsoft.com/office/powerpoint/2010/main" val="2907784962"/>
+        <p14:creationId xmlns:p14="http://schemas.microsoft.com/office/powerpoint/2010/main" val="3548848192"/>
       </p:ext>
     </p:extLst>
   </p:cSld>
@@ -12159,7 +13339,7 @@
           <a:p>
             <a:r>
               <a:rPr lang="en-US" dirty="0" smtClean="0"/>
-              <a:t>INTERRUPT HANDLING</a:t>
+              <a:t>Modules and classes:</a:t>
             </a:r>
             <a:endParaRPr lang="en-IN" dirty="0"/>
           </a:p>
@@ -12187,7 +13367,7 @@
     </p:spTree>
     <p:extLst>
       <p:ext uri="{BB962C8B-B14F-4D97-AF65-F5344CB8AC3E}">
-        <p14:creationId xmlns:p14="http://schemas.microsoft.com/office/powerpoint/2010/main" val="2521435045"/>
+        <p14:creationId xmlns:p14="http://schemas.microsoft.com/office/powerpoint/2010/main" val="785913305"/>
       </p:ext>
     </p:extLst>
   </p:cSld>
@@ -12231,7 +13411,7 @@
           <a:p>
             <a:r>
               <a:rPr lang="en-US" dirty="0" smtClean="0"/>
-              <a:t>CONCORRENCY AND RICE CONDITION</a:t>
+              <a:t>Security issues:</a:t>
             </a:r>
             <a:endParaRPr lang="en-IN" dirty="0"/>
           </a:p>
@@ -12259,7 +13439,7 @@
     </p:spTree>
     <p:extLst>
       <p:ext uri="{BB962C8B-B14F-4D97-AF65-F5344CB8AC3E}">
-        <p14:creationId xmlns:p14="http://schemas.microsoft.com/office/powerpoint/2010/main" val="2958807930"/>
+        <p14:creationId xmlns:p14="http://schemas.microsoft.com/office/powerpoint/2010/main" val="1186458178"/>
       </p:ext>
     </p:extLst>
   </p:cSld>

</xml_diff>